<commit_message>
added a zip file containing most of the required files for the hand-in
</commit_message>
<xml_diff>
--- a/ex3/presentation_ex_3_ver02.pptx
+++ b/ex3/presentation_ex_3_ver02.pptx
@@ -24,6 +24,8 @@
     <p:sldId id="273" r:id="rId18"/>
     <p:sldId id="274" r:id="rId19"/>
     <p:sldId id="275" r:id="rId20"/>
+    <p:sldId id="276" r:id="rId21"/>
+    <p:sldId id="277" r:id="rId22"/>
   </p:sldIdLst>
   <p:sldSz cx="12192000" cy="6858000"/>
   <p:notesSz cx="6858000" cy="9144000"/>
@@ -562,7 +564,7 @@
   <pc:docChgLst>
     <pc:chgData name="Haubenburger, Gabriel" userId="d79be2aa-0303-4748-b5e6-c8202455e92e" providerId="ADAL" clId="{DE5DAF71-5BBF-41EE-B8A3-F1AA83675C76}"/>
     <pc:docChg chg="custSel addSld modSld">
-      <pc:chgData name="Haubenburger, Gabriel" userId="d79be2aa-0303-4748-b5e6-c8202455e92e" providerId="ADAL" clId="{DE5DAF71-5BBF-41EE-B8A3-F1AA83675C76}" dt="2025-02-26T14:32:52.384" v="1051" actId="20577"/>
+      <pc:chgData name="Haubenburger, Gabriel" userId="d79be2aa-0303-4748-b5e6-c8202455e92e" providerId="ADAL" clId="{DE5DAF71-5BBF-41EE-B8A3-F1AA83675C76}" dt="2025-02-26T15:06:36.989" v="1109" actId="20577"/>
       <pc:docMkLst>
         <pc:docMk/>
       </pc:docMkLst>
@@ -788,6 +790,36 @@
             <pc:docMk/>
             <pc:sldMk cId="843519229" sldId="275"/>
             <ac:spMk id="2" creationId="{C426F002-A686-D47A-248A-39DD9005AED7}"/>
+          </ac:spMkLst>
+        </pc:spChg>
+      </pc:sldChg>
+      <pc:sldChg chg="modSp new mod">
+        <pc:chgData name="Haubenburger, Gabriel" userId="d79be2aa-0303-4748-b5e6-c8202455e92e" providerId="ADAL" clId="{DE5DAF71-5BBF-41EE-B8A3-F1AA83675C76}" dt="2025-02-26T15:06:22.077" v="1081" actId="20577"/>
+        <pc:sldMkLst>
+          <pc:docMk/>
+          <pc:sldMk cId="2974530302" sldId="276"/>
+        </pc:sldMkLst>
+        <pc:spChg chg="mod">
+          <ac:chgData name="Haubenburger, Gabriel" userId="d79be2aa-0303-4748-b5e6-c8202455e92e" providerId="ADAL" clId="{DE5DAF71-5BBF-41EE-B8A3-F1AA83675C76}" dt="2025-02-26T15:06:22.077" v="1081" actId="20577"/>
+          <ac:spMkLst>
+            <pc:docMk/>
+            <pc:sldMk cId="2974530302" sldId="276"/>
+            <ac:spMk id="2" creationId="{C679A8AB-C974-CB21-62E3-DA95DF5786D3}"/>
+          </ac:spMkLst>
+        </pc:spChg>
+      </pc:sldChg>
+      <pc:sldChg chg="modSp new mod">
+        <pc:chgData name="Haubenburger, Gabriel" userId="d79be2aa-0303-4748-b5e6-c8202455e92e" providerId="ADAL" clId="{DE5DAF71-5BBF-41EE-B8A3-F1AA83675C76}" dt="2025-02-26T15:06:36.989" v="1109" actId="20577"/>
+        <pc:sldMkLst>
+          <pc:docMk/>
+          <pc:sldMk cId="1596823217" sldId="277"/>
+        </pc:sldMkLst>
+        <pc:spChg chg="mod">
+          <ac:chgData name="Haubenburger, Gabriel" userId="d79be2aa-0303-4748-b5e6-c8202455e92e" providerId="ADAL" clId="{DE5DAF71-5BBF-41EE-B8A3-F1AA83675C76}" dt="2025-02-26T15:06:36.989" v="1109" actId="20577"/>
+          <ac:spMkLst>
+            <pc:docMk/>
+            <pc:sldMk cId="1596823217" sldId="277"/>
+            <ac:spMk id="2" creationId="{75925B4B-5D7A-D49E-6CA6-6594FCD55082}"/>
           </ac:spMkLst>
         </pc:spChg>
       </pc:sldChg>
@@ -5789,6 +5821,214 @@
     <p:extLst>
       <p:ext uri="{BB962C8B-B14F-4D97-AF65-F5344CB8AC3E}">
         <p14:creationId xmlns:p14="http://schemas.microsoft.com/office/powerpoint/2010/main" val="2717143054"/>
+      </p:ext>
+    </p:extLst>
+  </p:cSld>
+  <p:clrMapOvr>
+    <a:masterClrMapping/>
+  </p:clrMapOvr>
+</p:sld>
+</file>
+
+<file path=ppt/slides/slide20.xml><?xml version="1.0" encoding="utf-8"?>
+<p:sld xmlns:a="http://schemas.openxmlformats.org/drawingml/2006/main" xmlns:r="http://schemas.openxmlformats.org/officeDocument/2006/relationships" xmlns:p="http://schemas.openxmlformats.org/presentationml/2006/main">
+  <p:cSld>
+    <p:spTree>
+      <p:nvGrpSpPr>
+        <p:cNvPr id="1" name=""/>
+        <p:cNvGrpSpPr/>
+        <p:nvPr/>
+      </p:nvGrpSpPr>
+      <p:grpSpPr>
+        <a:xfrm>
+          <a:off x="0" y="0"/>
+          <a:ext cx="0" cy="0"/>
+          <a:chOff x="0" y="0"/>
+          <a:chExt cx="0" cy="0"/>
+        </a:xfrm>
+      </p:grpSpPr>
+      <p:sp>
+        <p:nvSpPr>
+          <p:cNvPr id="2" name="Title 1">
+            <a:extLst>
+              <a:ext uri="{FF2B5EF4-FFF2-40B4-BE49-F238E27FC236}">
+                <a16:creationId xmlns:a16="http://schemas.microsoft.com/office/drawing/2014/main" id="{C679A8AB-C974-CB21-62E3-DA95DF5786D3}"/>
+              </a:ext>
+            </a:extLst>
+          </p:cNvPr>
+          <p:cNvSpPr>
+            <a:spLocks noGrp="1"/>
+          </p:cNvSpPr>
+          <p:nvPr>
+            <p:ph type="title"/>
+          </p:nvPr>
+        </p:nvSpPr>
+        <p:spPr/>
+        <p:txBody>
+          <a:bodyPr/>
+          <a:lstStyle/>
+          <a:p>
+            <a:r>
+              <a:rPr lang="de-DE" dirty="0" err="1"/>
+              <a:t>Results</a:t>
+            </a:r>
+            <a:r>
+              <a:rPr lang="de-DE" dirty="0"/>
+              <a:t> / </a:t>
+            </a:r>
+            <a:r>
+              <a:rPr lang="de-DE" dirty="0" err="1"/>
+              <a:t>Lessons</a:t>
+            </a:r>
+            <a:r>
+              <a:rPr lang="de-DE" dirty="0"/>
+              <a:t> </a:t>
+            </a:r>
+            <a:r>
+              <a:rPr lang="de-DE" dirty="0" err="1"/>
+              <a:t>learned</a:t>
+            </a:r>
+            <a:r>
+              <a:rPr lang="de-DE" dirty="0"/>
+              <a:t> 1</a:t>
+            </a:r>
+            <a:endParaRPr lang="en-US" dirty="0"/>
+          </a:p>
+        </p:txBody>
+      </p:sp>
+      <p:sp>
+        <p:nvSpPr>
+          <p:cNvPr id="3" name="Content Placeholder 2">
+            <a:extLst>
+              <a:ext uri="{FF2B5EF4-FFF2-40B4-BE49-F238E27FC236}">
+                <a16:creationId xmlns:a16="http://schemas.microsoft.com/office/drawing/2014/main" id="{2425AE37-EBB0-D59D-9CE9-13FBB15B620B}"/>
+              </a:ext>
+            </a:extLst>
+          </p:cNvPr>
+          <p:cNvSpPr>
+            <a:spLocks noGrp="1"/>
+          </p:cNvSpPr>
+          <p:nvPr>
+            <p:ph idx="1"/>
+          </p:nvPr>
+        </p:nvSpPr>
+        <p:spPr/>
+        <p:txBody>
+          <a:bodyPr/>
+          <a:lstStyle/>
+          <a:p>
+            <a:endParaRPr lang="en-US"/>
+          </a:p>
+        </p:txBody>
+      </p:sp>
+    </p:spTree>
+    <p:extLst>
+      <p:ext uri="{BB962C8B-B14F-4D97-AF65-F5344CB8AC3E}">
+        <p14:creationId xmlns:p14="http://schemas.microsoft.com/office/powerpoint/2010/main" val="2974530302"/>
+      </p:ext>
+    </p:extLst>
+  </p:cSld>
+  <p:clrMapOvr>
+    <a:masterClrMapping/>
+  </p:clrMapOvr>
+</p:sld>
+</file>
+
+<file path=ppt/slides/slide21.xml><?xml version="1.0" encoding="utf-8"?>
+<p:sld xmlns:a="http://schemas.openxmlformats.org/drawingml/2006/main" xmlns:r="http://schemas.openxmlformats.org/officeDocument/2006/relationships" xmlns:p="http://schemas.openxmlformats.org/presentationml/2006/main">
+  <p:cSld>
+    <p:spTree>
+      <p:nvGrpSpPr>
+        <p:cNvPr id="1" name=""/>
+        <p:cNvGrpSpPr/>
+        <p:nvPr/>
+      </p:nvGrpSpPr>
+      <p:grpSpPr>
+        <a:xfrm>
+          <a:off x="0" y="0"/>
+          <a:ext cx="0" cy="0"/>
+          <a:chOff x="0" y="0"/>
+          <a:chExt cx="0" cy="0"/>
+        </a:xfrm>
+      </p:grpSpPr>
+      <p:sp>
+        <p:nvSpPr>
+          <p:cNvPr id="2" name="Title 1">
+            <a:extLst>
+              <a:ext uri="{FF2B5EF4-FFF2-40B4-BE49-F238E27FC236}">
+                <a16:creationId xmlns:a16="http://schemas.microsoft.com/office/drawing/2014/main" id="{75925B4B-5D7A-D49E-6CA6-6594FCD55082}"/>
+              </a:ext>
+            </a:extLst>
+          </p:cNvPr>
+          <p:cNvSpPr>
+            <a:spLocks noGrp="1"/>
+          </p:cNvSpPr>
+          <p:nvPr>
+            <p:ph type="title"/>
+          </p:nvPr>
+        </p:nvSpPr>
+        <p:spPr/>
+        <p:txBody>
+          <a:bodyPr/>
+          <a:lstStyle/>
+          <a:p>
+            <a:r>
+              <a:rPr lang="de-DE" dirty="0" err="1"/>
+              <a:t>Results</a:t>
+            </a:r>
+            <a:r>
+              <a:rPr lang="de-DE" dirty="0"/>
+              <a:t> / </a:t>
+            </a:r>
+            <a:r>
+              <a:rPr lang="de-DE" dirty="0" err="1"/>
+              <a:t>Lessons</a:t>
+            </a:r>
+            <a:r>
+              <a:rPr lang="de-DE" dirty="0"/>
+              <a:t> </a:t>
+            </a:r>
+            <a:r>
+              <a:rPr lang="de-DE" dirty="0" err="1"/>
+              <a:t>learned</a:t>
+            </a:r>
+            <a:r>
+              <a:rPr lang="de-DE" dirty="0"/>
+              <a:t> 2</a:t>
+            </a:r>
+            <a:endParaRPr lang="en-US" dirty="0"/>
+          </a:p>
+        </p:txBody>
+      </p:sp>
+      <p:sp>
+        <p:nvSpPr>
+          <p:cNvPr id="3" name="Content Placeholder 2">
+            <a:extLst>
+              <a:ext uri="{FF2B5EF4-FFF2-40B4-BE49-F238E27FC236}">
+                <a16:creationId xmlns:a16="http://schemas.microsoft.com/office/drawing/2014/main" id="{A75861F5-DAA5-B6D4-8EF2-FD4E95523A6D}"/>
+              </a:ext>
+            </a:extLst>
+          </p:cNvPr>
+          <p:cNvSpPr>
+            <a:spLocks noGrp="1"/>
+          </p:cNvSpPr>
+          <p:nvPr>
+            <p:ph idx="1"/>
+          </p:nvPr>
+        </p:nvSpPr>
+        <p:spPr/>
+        <p:txBody>
+          <a:bodyPr/>
+          <a:lstStyle/>
+          <a:p>
+            <a:endParaRPr lang="en-US"/>
+          </a:p>
+        </p:txBody>
+      </p:sp>
+    </p:spTree>
+    <p:extLst>
+      <p:ext uri="{BB962C8B-B14F-4D97-AF65-F5344CB8AC3E}">
+        <p14:creationId xmlns:p14="http://schemas.microsoft.com/office/powerpoint/2010/main" val="1596823217"/>
       </p:ext>
     </p:extLst>
   </p:cSld>

</xml_diff>